<commit_message>
feat: add new module 4 and definition of example code
</commit_message>
<xml_diff>
--- a/Unidad_3/Presentación.pptx
+++ b/Unidad_3/Presentación.pptx
@@ -5,15 +5,16 @@
     <p:sldMasterId id="2147483648" r:id="rId4"/>
   </p:sldMasterIdLst>
   <p:notesMasterIdLst>
-    <p:notesMasterId r:id="rId11"/>
+    <p:notesMasterId r:id="rId12"/>
   </p:notesMasterIdLst>
   <p:sldIdLst>
     <p:sldId id="256" r:id="rId5"/>
     <p:sldId id="257" r:id="rId6"/>
     <p:sldId id="273" r:id="rId7"/>
     <p:sldId id="274" r:id="rId8"/>
-    <p:sldId id="275" r:id="rId9"/>
-    <p:sldId id="276" r:id="rId10"/>
+    <p:sldId id="277" r:id="rId9"/>
+    <p:sldId id="275" r:id="rId10"/>
+    <p:sldId id="276" r:id="rId11"/>
   </p:sldIdLst>
   <p:sldSz cx="12192000" cy="6858000"/>
   <p:notesSz cx="6858000" cy="9144000"/>
@@ -213,7 +214,7 @@
           <a:p>
             <a:fld id="{F29DC657-A5B9-41B4-AB57-79E3DB3481E8}" type="datetimeFigureOut">
               <a:rPr lang="en-US" smtClean="0"/>
-              <a:t>9/17/2024</a:t>
+              <a:t>9/18/2024</a:t>
             </a:fld>
             <a:endParaRPr lang="en-US"/>
           </a:p>
@@ -795,7 +796,7 @@
           <a:p>
             <a:fld id="{E0B89D21-97A6-4434-B3B1-BAF5738D61F3}" type="datetimeFigureOut">
               <a:rPr lang="en-US" smtClean="0"/>
-              <a:t>9/17/2024</a:t>
+              <a:t>9/18/2024</a:t>
             </a:fld>
             <a:endParaRPr lang="en-US"/>
           </a:p>
@@ -993,7 +994,7 @@
           <a:p>
             <a:fld id="{E0B89D21-97A6-4434-B3B1-BAF5738D61F3}" type="datetimeFigureOut">
               <a:rPr lang="en-US" smtClean="0"/>
-              <a:t>9/17/2024</a:t>
+              <a:t>9/18/2024</a:t>
             </a:fld>
             <a:endParaRPr lang="en-US"/>
           </a:p>
@@ -1201,7 +1202,7 @@
           <a:p>
             <a:fld id="{E0B89D21-97A6-4434-B3B1-BAF5738D61F3}" type="datetimeFigureOut">
               <a:rPr lang="en-US" smtClean="0"/>
-              <a:t>9/17/2024</a:t>
+              <a:t>9/18/2024</a:t>
             </a:fld>
             <a:endParaRPr lang="en-US"/>
           </a:p>
@@ -1468,7 +1469,7 @@
           <a:p>
             <a:fld id="{E0B89D21-97A6-4434-B3B1-BAF5738D61F3}" type="datetimeFigureOut">
               <a:rPr lang="en-US" smtClean="0"/>
-              <a:t>9/17/2024</a:t>
+              <a:t>9/18/2024</a:t>
             </a:fld>
             <a:endParaRPr lang="en-US"/>
           </a:p>
@@ -1743,7 +1744,7 @@
           <a:p>
             <a:fld id="{E0B89D21-97A6-4434-B3B1-BAF5738D61F3}" type="datetimeFigureOut">
               <a:rPr lang="en-US" smtClean="0"/>
-              <a:t>9/17/2024</a:t>
+              <a:t>9/18/2024</a:t>
             </a:fld>
             <a:endParaRPr lang="en-US"/>
           </a:p>
@@ -2008,7 +2009,7 @@
           <a:p>
             <a:fld id="{E0B89D21-97A6-4434-B3B1-BAF5738D61F3}" type="datetimeFigureOut">
               <a:rPr lang="en-US" smtClean="0"/>
-              <a:t>9/17/2024</a:t>
+              <a:t>9/18/2024</a:t>
             </a:fld>
             <a:endParaRPr lang="en-US"/>
           </a:p>
@@ -2420,7 +2421,7 @@
           <a:p>
             <a:fld id="{E0B89D21-97A6-4434-B3B1-BAF5738D61F3}" type="datetimeFigureOut">
               <a:rPr lang="en-US" smtClean="0"/>
-              <a:t>9/17/2024</a:t>
+              <a:t>9/18/2024</a:t>
             </a:fld>
             <a:endParaRPr lang="en-US"/>
           </a:p>
@@ -2561,7 +2562,7 @@
           <a:p>
             <a:fld id="{E0B89D21-97A6-4434-B3B1-BAF5738D61F3}" type="datetimeFigureOut">
               <a:rPr lang="en-US" smtClean="0"/>
-              <a:t>9/17/2024</a:t>
+              <a:t>9/18/2024</a:t>
             </a:fld>
             <a:endParaRPr lang="en-US"/>
           </a:p>
@@ -2674,7 +2675,7 @@
           <a:p>
             <a:fld id="{E0B89D21-97A6-4434-B3B1-BAF5738D61F3}" type="datetimeFigureOut">
               <a:rPr lang="en-US" smtClean="0"/>
-              <a:t>9/17/2024</a:t>
+              <a:t>9/18/2024</a:t>
             </a:fld>
             <a:endParaRPr lang="en-US"/>
           </a:p>
@@ -2985,7 +2986,7 @@
           <a:p>
             <a:fld id="{E0B89D21-97A6-4434-B3B1-BAF5738D61F3}" type="datetimeFigureOut">
               <a:rPr lang="en-US" smtClean="0"/>
-              <a:t>9/17/2024</a:t>
+              <a:t>9/18/2024</a:t>
             </a:fld>
             <a:endParaRPr lang="en-US"/>
           </a:p>
@@ -3273,7 +3274,7 @@
           <a:p>
             <a:fld id="{E0B89D21-97A6-4434-B3B1-BAF5738D61F3}" type="datetimeFigureOut">
               <a:rPr lang="en-US" smtClean="0"/>
-              <a:t>9/17/2024</a:t>
+              <a:t>9/18/2024</a:t>
             </a:fld>
             <a:endParaRPr lang="en-US"/>
           </a:p>
@@ -3514,7 +3515,7 @@
           <a:p>
             <a:fld id="{E0B89D21-97A6-4434-B3B1-BAF5738D61F3}" type="datetimeFigureOut">
               <a:rPr lang="en-US" smtClean="0"/>
-              <a:t>9/17/2024</a:t>
+              <a:t>9/18/2024</a:t>
             </a:fld>
             <a:endParaRPr lang="en-US"/>
           </a:p>
@@ -4324,6 +4325,14 @@
 <file path=ppt/slides/slide5.xml><?xml version="1.0" encoding="utf-8"?>
 <p:sld xmlns:a="http://schemas.openxmlformats.org/drawingml/2006/main" xmlns:r="http://schemas.openxmlformats.org/officeDocument/2006/relationships" xmlns:p="http://schemas.openxmlformats.org/presentationml/2006/main">
   <p:cSld>
+    <p:bg>
+      <p:bgPr>
+        <a:solidFill>
+          <a:schemeClr val="bg1"/>
+        </a:solidFill>
+        <a:effectLst/>
+      </p:bgPr>
+    </p:bg>
     <p:spTree>
       <p:nvGrpSpPr>
         <p:cNvPr id="1" name=""/>
@@ -4338,6 +4347,65 @@
           <a:chExt cx="0" cy="0"/>
         </a:xfrm>
       </p:grpSpPr>
+      <p:pic>
+        <p:nvPicPr>
+          <p:cNvPr id="11" name="Picture 10" descr="A screenshot of a computer&#10;&#10;Description automatically generated">
+            <a:extLst>
+              <a:ext uri="{FF2B5EF4-FFF2-40B4-BE49-F238E27FC236}">
+                <a16:creationId xmlns:a16="http://schemas.microsoft.com/office/drawing/2014/main" id="{7395AA61-BC53-F266-EAC3-723F6A0205E8}"/>
+              </a:ext>
+            </a:extLst>
+          </p:cNvPr>
+          <p:cNvPicPr>
+            <a:picLocks noChangeAspect="1"/>
+          </p:cNvPicPr>
+          <p:nvPr/>
+        </p:nvPicPr>
+        <p:blipFill>
+          <a:blip r:embed="rId2"/>
+          <a:srcRect t="444"/>
+          <a:stretch/>
+        </p:blipFill>
+        <p:spPr>
+          <a:xfrm>
+            <a:off x="4912170" y="85526"/>
+            <a:ext cx="2367660" cy="6686948"/>
+          </a:xfrm>
+          <a:prstGeom prst="rect">
+            <a:avLst/>
+          </a:prstGeom>
+        </p:spPr>
+      </p:pic>
+    </p:spTree>
+    <p:extLst>
+      <p:ext uri="{BB962C8B-B14F-4D97-AF65-F5344CB8AC3E}">
+        <p14:creationId xmlns:p14="http://schemas.microsoft.com/office/powerpoint/2010/main" val="1860336297"/>
+      </p:ext>
+    </p:extLst>
+  </p:cSld>
+  <p:clrMapOvr>
+    <a:masterClrMapping/>
+  </p:clrMapOvr>
+</p:sld>
+</file>
+
+<file path=ppt/slides/slide6.xml><?xml version="1.0" encoding="utf-8"?>
+<p:sld xmlns:a="http://schemas.openxmlformats.org/drawingml/2006/main" xmlns:r="http://schemas.openxmlformats.org/officeDocument/2006/relationships" xmlns:p="http://schemas.openxmlformats.org/presentationml/2006/main">
+  <p:cSld>
+    <p:spTree>
+      <p:nvGrpSpPr>
+        <p:cNvPr id="1" name=""/>
+        <p:cNvGrpSpPr/>
+        <p:nvPr/>
+      </p:nvGrpSpPr>
+      <p:grpSpPr>
+        <a:xfrm>
+          <a:off x="0" y="0"/>
+          <a:ext cx="0" cy="0"/>
+          <a:chOff x="0" y="0"/>
+          <a:chExt cx="0" cy="0"/>
+        </a:xfrm>
+      </p:grpSpPr>
       <p:sp>
         <p:nvSpPr>
           <p:cNvPr id="2" name="Title 1">
@@ -4503,7 +4571,7 @@
 </p:sld>
 </file>
 
-<file path=ppt/slides/slide6.xml><?xml version="1.0" encoding="utf-8"?>
+<file path=ppt/slides/slide7.xml><?xml version="1.0" encoding="utf-8"?>
 <p:sld xmlns:a="http://schemas.openxmlformats.org/drawingml/2006/main" xmlns:r="http://schemas.openxmlformats.org/officeDocument/2006/relationships" xmlns:p="http://schemas.openxmlformats.org/presentationml/2006/main">
   <p:cSld>
     <p:spTree>
@@ -5490,14 +5558,6 @@
 </file>
 
 <file path=customXml/item2.xml><?xml version="1.0" encoding="utf-8"?>
-<p:properties xmlns:p="http://schemas.microsoft.com/office/2006/metadata/properties" xmlns:xsi="http://www.w3.org/2001/XMLSchema-instance" xmlns:pc="http://schemas.microsoft.com/office/infopath/2007/PartnerControls">
-  <documentManagement>
-    <_activity xmlns="98b3f1ad-107c-497c-bb15-64aaebc89f52" xsi:nil="true"/>
-  </documentManagement>
-</p:properties>
-</file>
-
-<file path=customXml/item3.xml><?xml version="1.0" encoding="utf-8"?>
 <ct:contentTypeSchema xmlns:ct="http://schemas.microsoft.com/office/2006/metadata/contentType" xmlns:ma="http://schemas.microsoft.com/office/2006/metadata/properties/metaAttributes" ct:_="" ma:_="" ma:contentTypeName="Documento" ma:contentTypeID="0x0101000ABC46EDA268834388609BD5B286F917" ma:contentTypeVersion="17" ma:contentTypeDescription="Crear nuevo documento." ma:contentTypeScope="" ma:versionID="b8ef759d716670bba47381dcbb7cab08">
   <xsd:schema xmlns:xsd="http://www.w3.org/2001/XMLSchema" xmlns:xs="http://www.w3.org/2001/XMLSchema" xmlns:p="http://schemas.microsoft.com/office/2006/metadata/properties" xmlns:ns3="98b3f1ad-107c-497c-bb15-64aaebc89f52" xmlns:ns4="a0690ee9-4047-4223-84b2-6b02f926f5d8" targetNamespace="http://schemas.microsoft.com/office/2006/metadata/properties" ma:root="true" ma:fieldsID="f0548e293e02a81e2d97140f47270d75" ns3:_="" ns4:_="">
     <xsd:import namespace="98b3f1ad-107c-497c-bb15-64aaebc89f52"/>
@@ -5744,6 +5804,14 @@
 </ct:contentTypeSchema>
 </file>
 
+<file path=customXml/item3.xml><?xml version="1.0" encoding="utf-8"?>
+<p:properties xmlns:p="http://schemas.microsoft.com/office/2006/metadata/properties" xmlns:xsi="http://www.w3.org/2001/XMLSchema-instance" xmlns:pc="http://schemas.microsoft.com/office/infopath/2007/PartnerControls">
+  <documentManagement>
+    <_activity xmlns="98b3f1ad-107c-497c-bb15-64aaebc89f52" xsi:nil="true"/>
+  </documentManagement>
+</p:properties>
+</file>
+
 <file path=customXml/itemProps1.xml><?xml version="1.0" encoding="utf-8"?>
 <ds:datastoreItem xmlns:ds="http://schemas.openxmlformats.org/officeDocument/2006/customXml" ds:itemID="{F5C501D5-0101-419A-AFBB-D8F04111C142}">
   <ds:schemaRefs>
@@ -5753,23 +5821,6 @@
 </file>
 
 <file path=customXml/itemProps2.xml><?xml version="1.0" encoding="utf-8"?>
-<ds:datastoreItem xmlns:ds="http://schemas.openxmlformats.org/officeDocument/2006/customXml" ds:itemID="{EEC6291A-1BB8-4D31-80EF-6AAECF11ECF7}">
-  <ds:schemaRefs>
-    <ds:schemaRef ds:uri="a0690ee9-4047-4223-84b2-6b02f926f5d8"/>
-    <ds:schemaRef ds:uri="http://www.w3.org/XML/1998/namespace"/>
-    <ds:schemaRef ds:uri="http://schemas.microsoft.com/office/2006/metadata/properties"/>
-    <ds:schemaRef ds:uri="http://schemas.microsoft.com/office/2006/documentManagement/types"/>
-    <ds:schemaRef ds:uri="98b3f1ad-107c-497c-bb15-64aaebc89f52"/>
-    <ds:schemaRef ds:uri="http://purl.org/dc/elements/1.1/"/>
-    <ds:schemaRef ds:uri="http://purl.org/dc/dcmitype/"/>
-    <ds:schemaRef ds:uri="http://purl.org/dc/terms/"/>
-    <ds:schemaRef ds:uri="http://schemas.microsoft.com/office/infopath/2007/PartnerControls"/>
-    <ds:schemaRef ds:uri="http://schemas.openxmlformats.org/package/2006/metadata/core-properties"/>
-  </ds:schemaRefs>
-</ds:datastoreItem>
-</file>
-
-<file path=customXml/itemProps3.xml><?xml version="1.0" encoding="utf-8"?>
 <ds:datastoreItem xmlns:ds="http://schemas.openxmlformats.org/officeDocument/2006/customXml" ds:itemID="{3FCEF456-3233-44D6-BC5A-12E8FD4D2764}">
   <ds:schemaRefs>
     <ds:schemaRef ds:uri="http://schemas.microsoft.com/office/2006/metadata/contentType"/>
@@ -5786,4 +5837,21 @@
     <ds:schemaRef ds:uri="http://schemas.microsoft.com/internal/obd"/>
   </ds:schemaRefs>
 </ds:datastoreItem>
+</file>
+
+<file path=customXml/itemProps3.xml><?xml version="1.0" encoding="utf-8"?>
+<ds:datastoreItem xmlns:ds="http://schemas.openxmlformats.org/officeDocument/2006/customXml" ds:itemID="{EEC6291A-1BB8-4D31-80EF-6AAECF11ECF7}">
+  <ds:schemaRefs>
+    <ds:schemaRef ds:uri="a0690ee9-4047-4223-84b2-6b02f926f5d8"/>
+    <ds:schemaRef ds:uri="http://www.w3.org/XML/1998/namespace"/>
+    <ds:schemaRef ds:uri="http://schemas.microsoft.com/office/2006/metadata/properties"/>
+    <ds:schemaRef ds:uri="http://schemas.microsoft.com/office/2006/documentManagement/types"/>
+    <ds:schemaRef ds:uri="98b3f1ad-107c-497c-bb15-64aaebc89f52"/>
+    <ds:schemaRef ds:uri="http://purl.org/dc/elements/1.1/"/>
+    <ds:schemaRef ds:uri="http://purl.org/dc/dcmitype/"/>
+    <ds:schemaRef ds:uri="http://purl.org/dc/terms/"/>
+    <ds:schemaRef ds:uri="http://schemas.microsoft.com/office/infopath/2007/PartnerControls"/>
+    <ds:schemaRef ds:uri="http://schemas.openxmlformats.org/package/2006/metadata/core-properties"/>
+  </ds:schemaRefs>
+</ds:datastoreItem>
 </file>
</xml_diff>